<commit_message>
Removed hessian from images but not from text yet. Waiting for further instructions
</commit_message>
<xml_diff>
--- a/other/flow chart_2.pptx
+++ b/other/flow chart_2.pptx
@@ -1733,8 +1733,8 @@
         </p:nvSpPr>
         <p:spPr>
           <a:xfrm>
-            <a:off x="839786" y="2057400"/>
-            <a:ext cx="3932241" cy="3811588"/>
+            <a:off x="839787" y="2057400"/>
+            <a:ext cx="3932240" cy="3811588"/>
           </a:xfrm>
           <a:prstGeom prst="rect">
             <a:avLst/>
@@ -3190,7 +3190,7 @@
         <p:spPr>
           <a:xfrm rot="5400000">
             <a:off x="7907900" y="4075499"/>
-            <a:ext cx="1454157" cy="1176517"/>
+            <a:ext cx="1454156" cy="1176517"/>
           </a:xfrm>
           <a:custGeom>
             <a:avLst/>
@@ -3256,7 +3256,7 @@
         </p:nvGrpSpPr>
         <p:grpSpPr>
           <a:xfrm>
-            <a:off x="8933709" y="3587292"/>
+            <a:off x="8933710" y="3587292"/>
             <a:ext cx="552078" cy="369336"/>
             <a:chOff x="0" y="-1"/>
             <a:chExt cx="552077" cy="369335"/>
@@ -3430,8 +3430,8 @@
         </p:nvGrpSpPr>
         <p:grpSpPr>
           <a:xfrm>
-            <a:off x="2264899" y="4970362"/>
-            <a:ext cx="1858843" cy="646333"/>
+            <a:off x="5166578" y="4794659"/>
+            <a:ext cx="1858844" cy="646333"/>
             <a:chOff x="0" y="0"/>
             <a:chExt cx="1858842" cy="646332"/>
           </a:xfrm>
@@ -3538,7 +3538,7 @@
         <p:spPr>
           <a:xfrm>
             <a:off x="1684712" y="2744705"/>
-            <a:ext cx="8473442" cy="2054510"/>
+            <a:ext cx="8473442" cy="2054511"/>
           </a:xfrm>
           <a:prstGeom prst="rect">
             <a:avLst/>
@@ -3578,8 +3578,8 @@
         </p:nvSpPr>
         <p:spPr>
           <a:xfrm>
-            <a:off x="1828919" y="2854505"/>
-            <a:ext cx="1085555" cy="447039"/>
+            <a:off x="1828918" y="2854505"/>
+            <a:ext cx="1085556" cy="447039"/>
           </a:xfrm>
           <a:prstGeom prst="rect">
             <a:avLst/>
@@ -4770,7 +4770,7 @@
         </p:nvSpPr>
         <p:spPr>
           <a:xfrm>
-            <a:off x="5807531" y="2898954"/>
+            <a:off x="5874119" y="3200198"/>
             <a:ext cx="508877" cy="358139"/>
           </a:xfrm>
           <a:prstGeom prst="rect">
@@ -4815,8 +4815,8 @@
         </p:nvSpPr>
         <p:spPr>
           <a:xfrm>
-            <a:off x="5723871" y="3592889"/>
-            <a:ext cx="676197" cy="358139"/>
+            <a:off x="5790459" y="3785208"/>
+            <a:ext cx="676198" cy="358139"/>
           </a:xfrm>
           <a:prstGeom prst="rect">
             <a:avLst/>
@@ -4860,7 +4860,7 @@
         </p:nvSpPr>
         <p:spPr>
           <a:xfrm>
-            <a:off x="5573294" y="4177899"/>
+            <a:off x="5639882" y="4370218"/>
             <a:ext cx="977351" cy="358139"/>
           </a:xfrm>
           <a:prstGeom prst="rect">
@@ -4905,7 +4905,7 @@
         </p:nvSpPr>
         <p:spPr>
           <a:xfrm>
-            <a:off x="5927641" y="3914626"/>
+            <a:off x="5994230" y="4106944"/>
             <a:ext cx="268656" cy="294639"/>
           </a:xfrm>
           <a:prstGeom prst="rect">
@@ -4953,7 +4953,7 @@
         </p:nvSpPr>
         <p:spPr>
           <a:xfrm>
-            <a:off x="5927641" y="3277672"/>
+            <a:off x="5994229" y="3572138"/>
             <a:ext cx="268656" cy="294639"/>
           </a:xfrm>
           <a:prstGeom prst="rect">
@@ -4995,14 +4995,14 @@
       </p:sp>
       <p:sp>
         <p:nvSpPr>
-          <p:cNvPr id="160" name="Connection Line"/>
+          <p:cNvPr id="161" name="Connection Line"/>
           <p:cNvSpPr/>
           <p:nvPr/>
         </p:nvSpPr>
         <p:spPr>
           <a:xfrm>
-            <a:off x="2474096" y="3124282"/>
-            <a:ext cx="3333436" cy="606041"/>
+            <a:off x="2474096" y="3404996"/>
+            <a:ext cx="3400024" cy="343807"/>
           </a:xfrm>
           <a:custGeom>
             <a:avLst/>
@@ -5057,14 +5057,200 @@
       </p:sp>
       <p:sp>
         <p:nvSpPr>
-          <p:cNvPr id="161" name="Connection Line"/>
+          <p:cNvPr id="162" name="Connection Line"/>
           <p:cNvSpPr/>
           <p:nvPr/>
         </p:nvSpPr>
         <p:spPr>
           <a:xfrm>
-            <a:off x="2474096" y="3771959"/>
-            <a:ext cx="3249776" cy="2"/>
+            <a:off x="2474096" y="3783301"/>
+            <a:ext cx="3316364" cy="164234"/>
+          </a:xfrm>
+          <a:custGeom>
+            <a:avLst/>
+            <a:gdLst/>
+            <a:ahLst/>
+            <a:cxnLst>
+              <a:cxn ang="0">
+                <a:pos x="wd2" y="hd2"/>
+              </a:cxn>
+              <a:cxn ang="5400000">
+                <a:pos x="wd2" y="hd2"/>
+              </a:cxn>
+              <a:cxn ang="10800000">
+                <a:pos x="wd2" y="hd2"/>
+              </a:cxn>
+              <a:cxn ang="16200000">
+                <a:pos x="wd2" y="hd2"/>
+              </a:cxn>
+            </a:cxnLst>
+            <a:rect l="0" t="0" r="r" b="b"/>
+            <a:pathLst>
+              <a:path w="21600" h="21600" fill="norm" stroke="1" extrusionOk="0">
+                <a:moveTo>
+                  <a:pt x="0" y="0"/>
+                </a:moveTo>
+                <a:cubicBezTo>
+                  <a:pt x="7200" y="7200"/>
+                  <a:pt x="14400" y="14400"/>
+                  <a:pt x="21600" y="21600"/>
+                </a:cubicBezTo>
+              </a:path>
+            </a:pathLst>
+          </a:custGeom>
+          <a:ln w="12700">
+            <a:solidFill>
+              <a:srgbClr val="000000"/>
+            </a:solidFill>
+            <a:custDash>
+              <a:ds d="200000" sp="200000"/>
+            </a:custDash>
+            <a:miter lim="400000"/>
+            <a:tailEnd type="triangle"/>
+          </a:ln>
+        </p:spPr>
+        <p:txBody>
+          <a:bodyPr/>
+          <a:lstStyle/>
+          <a:p>
+            <a:pPr/>
+          </a:p>
+        </p:txBody>
+      </p:sp>
+      <p:sp>
+        <p:nvSpPr>
+          <p:cNvPr id="163" name="Connection Line"/>
+          <p:cNvSpPr/>
+          <p:nvPr/>
+        </p:nvSpPr>
+        <p:spPr>
+          <a:xfrm>
+            <a:off x="2474096" y="3817801"/>
+            <a:ext cx="3165787" cy="633672"/>
+          </a:xfrm>
+          <a:custGeom>
+            <a:avLst/>
+            <a:gdLst/>
+            <a:ahLst/>
+            <a:cxnLst>
+              <a:cxn ang="0">
+                <a:pos x="wd2" y="hd2"/>
+              </a:cxn>
+              <a:cxn ang="5400000">
+                <a:pos x="wd2" y="hd2"/>
+              </a:cxn>
+              <a:cxn ang="10800000">
+                <a:pos x="wd2" y="hd2"/>
+              </a:cxn>
+              <a:cxn ang="16200000">
+                <a:pos x="wd2" y="hd2"/>
+              </a:cxn>
+            </a:cxnLst>
+            <a:rect l="0" t="0" r="r" b="b"/>
+            <a:pathLst>
+              <a:path w="21600" h="21600" fill="norm" stroke="1" extrusionOk="0">
+                <a:moveTo>
+                  <a:pt x="0" y="0"/>
+                </a:moveTo>
+                <a:cubicBezTo>
+                  <a:pt x="7200" y="7200"/>
+                  <a:pt x="14400" y="14400"/>
+                  <a:pt x="21600" y="21600"/>
+                </a:cubicBezTo>
+              </a:path>
+            </a:pathLst>
+          </a:custGeom>
+          <a:ln w="12700">
+            <a:solidFill>
+              <a:srgbClr val="000000"/>
+            </a:solidFill>
+            <a:custDash>
+              <a:ds d="200000" sp="200000"/>
+            </a:custDash>
+            <a:miter lim="400000"/>
+            <a:tailEnd type="triangle"/>
+          </a:ln>
+        </p:spPr>
+        <p:txBody>
+          <a:bodyPr/>
+          <a:lstStyle/>
+          <a:p>
+            <a:pPr/>
+          </a:p>
+        </p:txBody>
+      </p:sp>
+      <p:sp>
+        <p:nvSpPr>
+          <p:cNvPr id="164" name="Connection Line"/>
+          <p:cNvSpPr/>
+          <p:nvPr/>
+        </p:nvSpPr>
+        <p:spPr>
+          <a:xfrm>
+            <a:off x="6382998" y="3411695"/>
+            <a:ext cx="2550714" cy="325085"/>
+          </a:xfrm>
+          <a:custGeom>
+            <a:avLst/>
+            <a:gdLst/>
+            <a:ahLst/>
+            <a:cxnLst>
+              <a:cxn ang="0">
+                <a:pos x="wd2" y="hd2"/>
+              </a:cxn>
+              <a:cxn ang="5400000">
+                <a:pos x="wd2" y="hd2"/>
+              </a:cxn>
+              <a:cxn ang="10800000">
+                <a:pos x="wd2" y="hd2"/>
+              </a:cxn>
+              <a:cxn ang="16200000">
+                <a:pos x="wd2" y="hd2"/>
+              </a:cxn>
+            </a:cxnLst>
+            <a:rect l="0" t="0" r="r" b="b"/>
+            <a:pathLst>
+              <a:path w="21600" h="21600" fill="norm" stroke="1" extrusionOk="0">
+                <a:moveTo>
+                  <a:pt x="0" y="0"/>
+                </a:moveTo>
+                <a:cubicBezTo>
+                  <a:pt x="7200" y="7200"/>
+                  <a:pt x="14400" y="14400"/>
+                  <a:pt x="21600" y="21600"/>
+                </a:cubicBezTo>
+              </a:path>
+            </a:pathLst>
+          </a:custGeom>
+          <a:ln w="12700">
+            <a:solidFill>
+              <a:srgbClr val="000000"/>
+            </a:solidFill>
+            <a:custDash>
+              <a:ds d="200000" sp="200000"/>
+            </a:custDash>
+            <a:miter lim="400000"/>
+            <a:tailEnd type="triangle"/>
+          </a:ln>
+        </p:spPr>
+        <p:txBody>
+          <a:bodyPr/>
+          <a:lstStyle/>
+          <a:p>
+            <a:pPr/>
+          </a:p>
+        </p:txBody>
+      </p:sp>
+      <p:sp>
+        <p:nvSpPr>
+          <p:cNvPr id="165" name="Connection Line"/>
+          <p:cNvSpPr/>
+          <p:nvPr/>
+        </p:nvSpPr>
+        <p:spPr>
+          <a:xfrm>
+            <a:off x="6466658" y="3789189"/>
+            <a:ext cx="2467054" cy="153986"/>
           </a:xfrm>
           <a:custGeom>
             <a:avLst/>
@@ -5119,200 +5305,14 @@
       </p:sp>
       <p:sp>
         <p:nvSpPr>
-          <p:cNvPr id="162" name="Connection Line"/>
+          <p:cNvPr id="166" name="Connection Line"/>
           <p:cNvSpPr/>
           <p:nvPr/>
         </p:nvSpPr>
         <p:spPr>
           <a:xfrm>
-            <a:off x="2474096" y="3807062"/>
-            <a:ext cx="3099199" cy="475009"/>
-          </a:xfrm>
-          <a:custGeom>
-            <a:avLst/>
-            <a:gdLst/>
-            <a:ahLst/>
-            <a:cxnLst>
-              <a:cxn ang="0">
-                <a:pos x="wd2" y="hd2"/>
-              </a:cxn>
-              <a:cxn ang="5400000">
-                <a:pos x="wd2" y="hd2"/>
-              </a:cxn>
-              <a:cxn ang="10800000">
-                <a:pos x="wd2" y="hd2"/>
-              </a:cxn>
-              <a:cxn ang="16200000">
-                <a:pos x="wd2" y="hd2"/>
-              </a:cxn>
-            </a:cxnLst>
-            <a:rect l="0" t="0" r="r" b="b"/>
-            <a:pathLst>
-              <a:path w="21600" h="21600" fill="norm" stroke="1" extrusionOk="0">
-                <a:moveTo>
-                  <a:pt x="0" y="0"/>
-                </a:moveTo>
-                <a:cubicBezTo>
-                  <a:pt x="7200" y="7200"/>
-                  <a:pt x="14400" y="14400"/>
-                  <a:pt x="21600" y="21600"/>
-                </a:cubicBezTo>
-              </a:path>
-            </a:pathLst>
-          </a:custGeom>
-          <a:ln w="12700">
-            <a:solidFill>
-              <a:srgbClr val="000000"/>
-            </a:solidFill>
-            <a:custDash>
-              <a:ds d="200000" sp="200000"/>
-            </a:custDash>
-            <a:miter lim="400000"/>
-            <a:tailEnd type="triangle"/>
-          </a:ln>
-        </p:spPr>
-        <p:txBody>
-          <a:bodyPr/>
-          <a:lstStyle/>
-          <a:p>
-            <a:pPr/>
-          </a:p>
-        </p:txBody>
-      </p:sp>
-      <p:sp>
-        <p:nvSpPr>
-          <p:cNvPr id="163" name="Connection Line"/>
-          <p:cNvSpPr/>
-          <p:nvPr/>
-        </p:nvSpPr>
-        <p:spPr>
-          <a:xfrm>
-            <a:off x="6316410" y="3134115"/>
-            <a:ext cx="2617301" cy="576993"/>
-          </a:xfrm>
-          <a:custGeom>
-            <a:avLst/>
-            <a:gdLst/>
-            <a:ahLst/>
-            <a:cxnLst>
-              <a:cxn ang="0">
-                <a:pos x="wd2" y="hd2"/>
-              </a:cxn>
-              <a:cxn ang="5400000">
-                <a:pos x="wd2" y="hd2"/>
-              </a:cxn>
-              <a:cxn ang="10800000">
-                <a:pos x="wd2" y="hd2"/>
-              </a:cxn>
-              <a:cxn ang="16200000">
-                <a:pos x="wd2" y="hd2"/>
-              </a:cxn>
-            </a:cxnLst>
-            <a:rect l="0" t="0" r="r" b="b"/>
-            <a:pathLst>
-              <a:path w="21600" h="21600" fill="norm" stroke="1" extrusionOk="0">
-                <a:moveTo>
-                  <a:pt x="0" y="0"/>
-                </a:moveTo>
-                <a:cubicBezTo>
-                  <a:pt x="7200" y="7200"/>
-                  <a:pt x="14400" y="14400"/>
-                  <a:pt x="21600" y="21600"/>
-                </a:cubicBezTo>
-              </a:path>
-            </a:pathLst>
-          </a:custGeom>
-          <a:ln w="12700">
-            <a:solidFill>
-              <a:srgbClr val="000000"/>
-            </a:solidFill>
-            <a:custDash>
-              <a:ds d="200000" sp="200000"/>
-            </a:custDash>
-            <a:miter lim="400000"/>
-            <a:tailEnd type="triangle"/>
-          </a:ln>
-        </p:spPr>
-        <p:txBody>
-          <a:bodyPr/>
-          <a:lstStyle/>
-          <a:p>
-            <a:pPr/>
-          </a:p>
-        </p:txBody>
-      </p:sp>
-      <p:sp>
-        <p:nvSpPr>
-          <p:cNvPr id="164" name="Connection Line"/>
-          <p:cNvSpPr/>
-          <p:nvPr/>
-        </p:nvSpPr>
-        <p:spPr>
-          <a:xfrm>
-            <a:off x="6400070" y="3771959"/>
-            <a:ext cx="2533641" cy="2"/>
-          </a:xfrm>
-          <a:custGeom>
-            <a:avLst/>
-            <a:gdLst/>
-            <a:ahLst/>
-            <a:cxnLst>
-              <a:cxn ang="0">
-                <a:pos x="wd2" y="hd2"/>
-              </a:cxn>
-              <a:cxn ang="5400000">
-                <a:pos x="wd2" y="hd2"/>
-              </a:cxn>
-              <a:cxn ang="10800000">
-                <a:pos x="wd2" y="hd2"/>
-              </a:cxn>
-              <a:cxn ang="16200000">
-                <a:pos x="wd2" y="hd2"/>
-              </a:cxn>
-            </a:cxnLst>
-            <a:rect l="0" t="0" r="r" b="b"/>
-            <a:pathLst>
-              <a:path w="21600" h="21600" fill="norm" stroke="1" extrusionOk="0">
-                <a:moveTo>
-                  <a:pt x="0" y="0"/>
-                </a:moveTo>
-                <a:cubicBezTo>
-                  <a:pt x="7200" y="7200"/>
-                  <a:pt x="14400" y="14400"/>
-                  <a:pt x="21600" y="21600"/>
-                </a:cubicBezTo>
-              </a:path>
-            </a:pathLst>
-          </a:custGeom>
-          <a:ln w="12700">
-            <a:solidFill>
-              <a:srgbClr val="000000"/>
-            </a:solidFill>
-            <a:custDash>
-              <a:ds d="200000" sp="200000"/>
-            </a:custDash>
-            <a:miter lim="400000"/>
-            <a:tailEnd type="triangle"/>
-          </a:ln>
-        </p:spPr>
-        <p:txBody>
-          <a:bodyPr/>
-          <a:lstStyle/>
-          <a:p>
-            <a:pPr/>
-          </a:p>
-        </p:txBody>
-      </p:sp>
-      <p:sp>
-        <p:nvSpPr>
-          <p:cNvPr id="165" name="Connection Line"/>
-          <p:cNvSpPr/>
-          <p:nvPr/>
-        </p:nvSpPr>
-        <p:spPr>
-          <a:xfrm>
-            <a:off x="6550646" y="3823261"/>
-            <a:ext cx="2383065" cy="442889"/>
+            <a:off x="6617234" y="3841599"/>
+            <a:ext cx="2316478" cy="584405"/>
           </a:xfrm>
           <a:custGeom>
             <a:avLst/>
@@ -5362,6 +5362,51 @@
           <a:lstStyle/>
           <a:p>
             <a:pPr/>
+          </a:p>
+        </p:txBody>
+      </p:sp>
+      <p:sp>
+        <p:nvSpPr>
+          <p:cNvPr id="160" name="OpenMP/CUDA for BLAS"/>
+          <p:cNvSpPr/>
+          <p:nvPr/>
+        </p:nvSpPr>
+        <p:spPr>
+          <a:xfrm>
+            <a:off x="4894944" y="2898956"/>
+            <a:ext cx="2515712" cy="358139"/>
+          </a:xfrm>
+          <a:prstGeom prst="rect">
+            <a:avLst/>
+          </a:prstGeom>
+          <a:ln w="12700">
+            <a:miter lim="400000"/>
+          </a:ln>
+          <a:extLst>
+            <a:ext uri="{C572A759-6A51-4108-AA02-DFA0A04FC94B}">
+              <ma14:wrappingTextBoxFlag xmlns:ma14="http://schemas.microsoft.com/office/mac/drawingml/2011/main" val="1"/>
+            </a:ext>
+          </a:extLst>
+        </p:spPr>
+        <p:txBody>
+          <a:bodyPr wrap="none" lIns="45718" tIns="45718" rIns="45718" bIns="45718">
+            <a:spAutoFit/>
+          </a:bodyPr>
+          <a:lstStyle>
+            <a:lvl1pPr>
+              <a:defRPr>
+                <a:latin typeface="+mn-lt"/>
+                <a:ea typeface="+mn-ea"/>
+                <a:cs typeface="+mn-cs"/>
+                <a:sym typeface="Calibri"/>
+              </a:defRPr>
+            </a:lvl1pPr>
+          </a:lstStyle>
+          <a:p>
+            <a:pPr/>
+            <a:r>
+              <a:t>OpenMP/CUDA for BLAS</a:t>
+            </a:r>
           </a:p>
         </p:txBody>
       </p:sp>

</xml_diff>

<commit_message>
changed true architecture and updated README
</commit_message>
<xml_diff>
--- a/other/flow chart_2.pptx
+++ b/other/flow chart_2.pptx
@@ -3253,8 +3253,8 @@
         </p:nvSpPr>
         <p:spPr>
           <a:xfrm>
-            <a:off x="2446595" y="2412589"/>
-            <a:ext cx="1856742" cy="1431291"/>
+            <a:off x="2446595" y="2412588"/>
+            <a:ext cx="1856742" cy="1431292"/>
           </a:xfrm>
           <a:custGeom>
             <a:avLst/>
@@ -3940,7 +3940,7 @@
         </p:nvSpPr>
         <p:spPr>
           <a:xfrm>
-            <a:off x="5996242" y="4699626"/>
+            <a:off x="5996242" y="4699627"/>
             <a:ext cx="662249" cy="447039"/>
           </a:xfrm>
           <a:prstGeom prst="rect">
@@ -4079,8 +4079,8 @@
         </p:nvSpPr>
         <p:spPr>
           <a:xfrm rot="6867900">
-            <a:off x="8746631" y="3642349"/>
-            <a:ext cx="190676" cy="1262183"/>
+            <a:off x="8746631" y="3642350"/>
+            <a:ext cx="190676" cy="1262182"/>
           </a:xfrm>
           <a:custGeom>
             <a:avLst/>
@@ -4173,7 +4173,7 @@
         </p:nvSpPr>
         <p:spPr>
           <a:xfrm rot="2452795">
-            <a:off x="4831843" y="4038552"/>
+            <a:off x="4831843" y="4038553"/>
             <a:ext cx="201461" cy="636049"/>
           </a:xfrm>
           <a:custGeom>
@@ -4267,7 +4267,7 @@
         </p:nvSpPr>
         <p:spPr>
           <a:xfrm rot="7920874">
-            <a:off x="7445885" y="4016334"/>
+            <a:off x="7445885" y="4016335"/>
             <a:ext cx="201461" cy="636049"/>
           </a:xfrm>
           <a:custGeom>
@@ -4716,8 +4716,8 @@
         </p:nvSpPr>
         <p:spPr>
           <a:xfrm>
-            <a:off x="5747863" y="3249931"/>
-            <a:ext cx="977350" cy="358139"/>
+            <a:off x="5468333" y="3249931"/>
+            <a:ext cx="1718068" cy="358139"/>
           </a:xfrm>
           <a:prstGeom prst="rect">
             <a:avLst/>
@@ -4735,28 +4735,14 @@
           <a:bodyPr wrap="none" lIns="45718" tIns="45718" rIns="45718" bIns="45718">
             <a:spAutoFit/>
           </a:bodyPr>
-          <a:lstStyle>
-            <a:lvl1pPr>
+          <a:lstStyle/>
+          <a:p>
+            <a:pPr>
               <a:defRPr>
-                <a:solidFill>
-                  <a:schemeClr val="accent5">
-                    <a:satOff val="-19091"/>
-                    <a:lumOff val="-11921"/>
-                  </a:schemeClr>
-                </a:solidFill>
                 <a:latin typeface="+mn-lt"/>
                 <a:ea typeface="+mn-ea"/>
                 <a:cs typeface="+mn-cs"/>
                 <a:sym typeface="Calibri"/>
-              </a:defRPr>
-            </a:lvl1pPr>
-          </a:lstStyle>
-          <a:p>
-            <a:pPr>
-              <a:defRPr>
-                <a:solidFill>
-                  <a:srgbClr val="000000"/>
-                </a:solidFill>
               </a:defRPr>
             </a:pPr>
             <a:r>
@@ -4768,7 +4754,26 @@
                   </a:schemeClr>
                 </a:solidFill>
               </a:rPr>
-              <a:t>AdaGrad</a:t>
+              <a:t>AdaGrad </a:t>
+            </a:r>
+            <a:r>
+              <a:rPr>
+                <a:solidFill>
+                  <a:srgbClr val="FF2600"/>
+                </a:solidFill>
+              </a:rPr>
+              <a:t>or</a:t>
+            </a:r>
+            <a:r>
+              <a:rPr>
+                <a:solidFill>
+                  <a:schemeClr val="accent5">
+                    <a:satOff val="-19091"/>
+                    <a:lumOff val="-11921"/>
+                  </a:schemeClr>
+                </a:solidFill>
+              </a:rPr>
+              <a:t> PSO</a:t>
             </a:r>
           </a:p>
         </p:txBody>

</xml_diff>

<commit_message>
removed PSO from graphic
</commit_message>
<xml_diff>
--- a/other/flow chart_2.pptx
+++ b/other/flow chart_2.pptx
@@ -4716,8 +4716,8 @@
         </p:nvSpPr>
         <p:spPr>
           <a:xfrm>
-            <a:off x="5468333" y="3249931"/>
-            <a:ext cx="1718068" cy="358139"/>
+            <a:off x="5747863" y="3213934"/>
+            <a:ext cx="977350" cy="358139"/>
           </a:xfrm>
           <a:prstGeom prst="rect">
             <a:avLst/>
@@ -4735,14 +4735,28 @@
           <a:bodyPr wrap="none" lIns="45718" tIns="45718" rIns="45718" bIns="45718">
             <a:spAutoFit/>
           </a:bodyPr>
-          <a:lstStyle/>
-          <a:p>
-            <a:pPr>
+          <a:lstStyle>
+            <a:lvl1pPr>
               <a:defRPr>
+                <a:solidFill>
+                  <a:schemeClr val="accent5">
+                    <a:satOff val="-19091"/>
+                    <a:lumOff val="-11921"/>
+                  </a:schemeClr>
+                </a:solidFill>
                 <a:latin typeface="+mn-lt"/>
                 <a:ea typeface="+mn-ea"/>
                 <a:cs typeface="+mn-cs"/>
                 <a:sym typeface="Calibri"/>
+              </a:defRPr>
+            </a:lvl1pPr>
+          </a:lstStyle>
+          <a:p>
+            <a:pPr>
+              <a:defRPr>
+                <a:solidFill>
+                  <a:srgbClr val="000000"/>
+                </a:solidFill>
               </a:defRPr>
             </a:pPr>
             <a:r>
@@ -4754,26 +4768,7 @@
                   </a:schemeClr>
                 </a:solidFill>
               </a:rPr>
-              <a:t>AdaGrad </a:t>
-            </a:r>
-            <a:r>
-              <a:rPr>
-                <a:solidFill>
-                  <a:srgbClr val="FF2600"/>
-                </a:solidFill>
-              </a:rPr>
-              <a:t>or</a:t>
-            </a:r>
-            <a:r>
-              <a:rPr>
-                <a:solidFill>
-                  <a:schemeClr val="accent5">
-                    <a:satOff val="-19091"/>
-                    <a:lumOff val="-11921"/>
-                  </a:schemeClr>
-                </a:solidFill>
-              </a:rPr>
-              <a:t> PSO</a:t>
+              <a:t>AdaGrad</a:t>
             </a:r>
           </a:p>
         </p:txBody>

</xml_diff>